<commit_message>
Updated content of power point presentation
</commit_message>
<xml_diff>
--- a/week_4/Regular Expressions.pptx
+++ b/week_4/Regular Expressions.pptx
@@ -11630,7 +11630,7 @@
                 </a:solidFill>
                 <a:latin typeface="Calibri (Body)"/>
               </a:rPr>
-              <a:t>aaaple</a:t>
+              <a:t>aaapple</a:t>
             </a:r>
             <a:endParaRPr lang="en-PH" sz="2500" b="1" dirty="0">
               <a:solidFill>
@@ -12395,7 +12395,7 @@
                 </a:solidFill>
                 <a:latin typeface="Calibri (Body)"/>
               </a:rPr>
-              <a:t>aaaple</a:t>
+              <a:t>aaapple</a:t>
             </a:r>
             <a:endParaRPr lang="en-PH" sz="2500" b="1" dirty="0">
               <a:solidFill>
@@ -14384,12 +14384,15 @@
                 </a:solidFill>
                 <a:latin typeface="Calibri (Body)"/>
               </a:rPr>
-              <a:t>?r</a:t>
-            </a:r>
-            <a:endParaRPr lang="en-PH" sz="2800" b="1" dirty="0">
-              <a:solidFill>
-                <a:srgbClr val="FF0000"/>
-              </a:solidFill>
+              <a:t>?</a:t>
+            </a:r>
+            <a:r>
+              <a:rPr lang="en-PH" sz="2800" dirty="0" err="1">
+                <a:latin typeface="Calibri (Body)"/>
+              </a:rPr>
+              <a:t>r</a:t>
+            </a:r>
+            <a:endParaRPr lang="en-PH" sz="2800" dirty="0">
               <a:latin typeface="Calibri (Body)"/>
             </a:endParaRPr>
           </a:p>
@@ -25361,11 +25364,11 @@
                   <a:srgbClr val="00B050"/>
                 </a:solidFill>
               </a:rPr>
-              <a:t>aeiou</a:t>
+              <a:t>aeioua</a:t>
             </a:r>
             <a:r>
               <a:rPr lang="en-PH" sz="2500" dirty="0" err="1"/>
-              <a:t>abc</a:t>
+              <a:t>bc</a:t>
             </a:r>
             <a:endParaRPr lang="en-PH" sz="2500" dirty="0"/>
           </a:p>

</xml_diff>